<commit_message>
First draft of ResortScraper class
</commit_message>
<xml_diff>
--- a/AI Core Project Part 1.pptx
+++ b/AI Core Project Part 1.pptx
@@ -109,6 +109,11 @@
       </a:defRPr>
     </a:lvl9pPr>
   </p:defaultTextStyle>
+  <p:extLst>
+    <p:ext uri="{EFAFB233-063F-42B5-8137-9DF3F51BA10A}">
+      <p15:sldGuideLst xmlns:p15="http://schemas.microsoft.com/office/powerpoint/2012/main"/>
+    </p:ext>
+  </p:extLst>
 </p:presentation>
 </file>
 
@@ -261,7 +266,7 @@
           <a:p>
             <a:fld id="{A426A761-8C7F-48DA-B3D6-0E0861BE466C}" type="datetimeFigureOut">
               <a:rPr lang="en-GB" smtClean="0"/>
-              <a:t>22/03/2021</a:t>
+              <a:t>25/03/2021</a:t>
             </a:fld>
             <a:endParaRPr lang="en-GB"/>
           </a:p>
@@ -461,7 +466,7 @@
           <a:p>
             <a:fld id="{A426A761-8C7F-48DA-B3D6-0E0861BE466C}" type="datetimeFigureOut">
               <a:rPr lang="en-GB" smtClean="0"/>
-              <a:t>22/03/2021</a:t>
+              <a:t>25/03/2021</a:t>
             </a:fld>
             <a:endParaRPr lang="en-GB"/>
           </a:p>
@@ -671,7 +676,7 @@
           <a:p>
             <a:fld id="{A426A761-8C7F-48DA-B3D6-0E0861BE466C}" type="datetimeFigureOut">
               <a:rPr lang="en-GB" smtClean="0"/>
-              <a:t>22/03/2021</a:t>
+              <a:t>25/03/2021</a:t>
             </a:fld>
             <a:endParaRPr lang="en-GB"/>
           </a:p>
@@ -871,7 +876,7 @@
           <a:p>
             <a:fld id="{A426A761-8C7F-48DA-B3D6-0E0861BE466C}" type="datetimeFigureOut">
               <a:rPr lang="en-GB" smtClean="0"/>
-              <a:t>22/03/2021</a:t>
+              <a:t>25/03/2021</a:t>
             </a:fld>
             <a:endParaRPr lang="en-GB"/>
           </a:p>
@@ -1147,7 +1152,7 @@
           <a:p>
             <a:fld id="{A426A761-8C7F-48DA-B3D6-0E0861BE466C}" type="datetimeFigureOut">
               <a:rPr lang="en-GB" smtClean="0"/>
-              <a:t>22/03/2021</a:t>
+              <a:t>25/03/2021</a:t>
             </a:fld>
             <a:endParaRPr lang="en-GB"/>
           </a:p>
@@ -1415,7 +1420,7 @@
           <a:p>
             <a:fld id="{A426A761-8C7F-48DA-B3D6-0E0861BE466C}" type="datetimeFigureOut">
               <a:rPr lang="en-GB" smtClean="0"/>
-              <a:t>22/03/2021</a:t>
+              <a:t>25/03/2021</a:t>
             </a:fld>
             <a:endParaRPr lang="en-GB"/>
           </a:p>
@@ -1830,7 +1835,7 @@
           <a:p>
             <a:fld id="{A426A761-8C7F-48DA-B3D6-0E0861BE466C}" type="datetimeFigureOut">
               <a:rPr lang="en-GB" smtClean="0"/>
-              <a:t>22/03/2021</a:t>
+              <a:t>25/03/2021</a:t>
             </a:fld>
             <a:endParaRPr lang="en-GB"/>
           </a:p>
@@ -1972,7 +1977,7 @@
           <a:p>
             <a:fld id="{A426A761-8C7F-48DA-B3D6-0E0861BE466C}" type="datetimeFigureOut">
               <a:rPr lang="en-GB" smtClean="0"/>
-              <a:t>22/03/2021</a:t>
+              <a:t>25/03/2021</a:t>
             </a:fld>
             <a:endParaRPr lang="en-GB"/>
           </a:p>
@@ -2085,7 +2090,7 @@
           <a:p>
             <a:fld id="{A426A761-8C7F-48DA-B3D6-0E0861BE466C}" type="datetimeFigureOut">
               <a:rPr lang="en-GB" smtClean="0"/>
-              <a:t>22/03/2021</a:t>
+              <a:t>25/03/2021</a:t>
             </a:fld>
             <a:endParaRPr lang="en-GB"/>
           </a:p>
@@ -2398,7 +2403,7 @@
           <a:p>
             <a:fld id="{A426A761-8C7F-48DA-B3D6-0E0861BE466C}" type="datetimeFigureOut">
               <a:rPr lang="en-GB" smtClean="0"/>
-              <a:t>22/03/2021</a:t>
+              <a:t>25/03/2021</a:t>
             </a:fld>
             <a:endParaRPr lang="en-GB"/>
           </a:p>
@@ -2687,7 +2692,7 @@
           <a:p>
             <a:fld id="{A426A761-8C7F-48DA-B3D6-0E0861BE466C}" type="datetimeFigureOut">
               <a:rPr lang="en-GB" smtClean="0"/>
-              <a:t>22/03/2021</a:t>
+              <a:t>25/03/2021</a:t>
             </a:fld>
             <a:endParaRPr lang="en-GB"/>
           </a:p>
@@ -2930,7 +2935,7 @@
           <a:p>
             <a:fld id="{A426A761-8C7F-48DA-B3D6-0E0861BE466C}" type="datetimeFigureOut">
               <a:rPr lang="en-GB" smtClean="0"/>
-              <a:t>22/03/2021</a:t>
+              <a:t>25/03/2021</a:t>
             </a:fld>
             <a:endParaRPr lang="en-GB"/>
           </a:p>
@@ -3843,6 +3848,177 @@
               <a:buNone/>
             </a:pPr>
             <a:endParaRPr lang="en-GB" dirty="0"/>
+          </a:p>
+        </p:txBody>
+      </p:sp>
+      <p:sp>
+        <p:nvSpPr>
+          <p:cNvPr id="5" name="TextBox 4">
+            <a:extLst>
+              <a:ext uri="{FF2B5EF4-FFF2-40B4-BE49-F238E27FC236}">
+                <a16:creationId xmlns:a16="http://schemas.microsoft.com/office/drawing/2014/main" id="{B032AAEC-207F-4FF2-9248-BC1CFE36E35B}"/>
+              </a:ext>
+            </a:extLst>
+          </p:cNvPr>
+          <p:cNvSpPr txBox="1"/>
+          <p:nvPr/>
+        </p:nvSpPr>
+        <p:spPr>
+          <a:xfrm>
+            <a:off x="1059110" y="1825625"/>
+            <a:ext cx="3697448" cy="4801314"/>
+          </a:xfrm>
+          <a:prstGeom prst="rect">
+            <a:avLst/>
+          </a:prstGeom>
+          <a:noFill/>
+        </p:spPr>
+        <p:txBody>
+          <a:bodyPr wrap="square">
+            <a:spAutoFit/>
+          </a:bodyPr>
+          <a:lstStyle/>
+          <a:p>
+            <a:r>
+              <a:rPr lang="en-GB" b="1" dirty="0"/>
+              <a:t>Column:</a:t>
+            </a:r>
+            <a:r>
+              <a:rPr lang="en-GB" dirty="0"/>
+              <a:t>		</a:t>
+            </a:r>
+            <a:r>
+              <a:rPr lang="en-GB" b="1" dirty="0"/>
+              <a:t>% Missing Values</a:t>
+            </a:r>
+          </a:p>
+          <a:p>
+            <a:r>
+              <a:rPr lang="en-GB" dirty="0"/>
+              <a:t>Name                  		0.0</a:t>
+            </a:r>
+          </a:p>
+          <a:p>
+            <a:r>
+              <a:rPr lang="en-GB" dirty="0"/>
+              <a:t>Continent              		0.0</a:t>
+            </a:r>
+          </a:p>
+          <a:p>
+            <a:r>
+              <a:rPr lang="en-GB" dirty="0"/>
+              <a:t>Country                		1.0</a:t>
+            </a:r>
+          </a:p>
+          <a:p>
+            <a:r>
+              <a:rPr lang="en-GB" dirty="0"/>
+              <a:t>Web Link               		0.0</a:t>
+            </a:r>
+          </a:p>
+          <a:p>
+            <a:r>
+              <a:rPr lang="en-GB" dirty="0"/>
+              <a:t>Page Link              		0.0</a:t>
+            </a:r>
+          </a:p>
+          <a:p>
+            <a:r>
+              <a:rPr lang="en-GB" dirty="0"/>
+              <a:t>Star Rating           		28.0</a:t>
+            </a:r>
+          </a:p>
+          <a:p>
+            <a:r>
+              <a:rPr lang="en-GB" dirty="0"/>
+              <a:t>Elevation Change    		13.0</a:t>
+            </a:r>
+          </a:p>
+          <a:p>
+            <a:r>
+              <a:rPr lang="en-GB" dirty="0"/>
+              <a:t>Base Elevation        		13.0</a:t>
+            </a:r>
+          </a:p>
+          <a:p>
+            <a:r>
+              <a:rPr lang="en-GB" dirty="0"/>
+              <a:t>Max Elevation         		13.0</a:t>
+            </a:r>
+          </a:p>
+          <a:p>
+            <a:r>
+              <a:rPr lang="en-GB" dirty="0"/>
+              <a:t>Total </a:t>
+            </a:r>
+            <a:r>
+              <a:rPr lang="en-GB" dirty="0" err="1"/>
+              <a:t>Piste</a:t>
+            </a:r>
+            <a:r>
+              <a:rPr lang="en-GB" dirty="0"/>
+              <a:t> Length    	16.0</a:t>
+            </a:r>
+          </a:p>
+          <a:p>
+            <a:r>
+              <a:rPr lang="en-GB" dirty="0"/>
+              <a:t>Blue </a:t>
+            </a:r>
+            <a:r>
+              <a:rPr lang="en-GB" dirty="0" err="1"/>
+              <a:t>Piste</a:t>
+            </a:r>
+            <a:r>
+              <a:rPr lang="en-GB" dirty="0"/>
+              <a:t> Length    		17.0</a:t>
+            </a:r>
+          </a:p>
+          <a:p>
+            <a:r>
+              <a:rPr lang="en-GB" dirty="0"/>
+              <a:t>Red </a:t>
+            </a:r>
+            <a:r>
+              <a:rPr lang="en-GB" dirty="0" err="1"/>
+              <a:t>Piste</a:t>
+            </a:r>
+            <a:r>
+              <a:rPr lang="en-GB" dirty="0"/>
+              <a:t> Length      	17.0</a:t>
+            </a:r>
+          </a:p>
+          <a:p>
+            <a:r>
+              <a:rPr lang="en-GB" dirty="0"/>
+              <a:t>Black </a:t>
+            </a:r>
+            <a:r>
+              <a:rPr lang="en-GB" dirty="0" err="1"/>
+              <a:t>Piste</a:t>
+            </a:r>
+            <a:r>
+              <a:rPr lang="en-GB" dirty="0"/>
+              <a:t> Length   		17.0</a:t>
+            </a:r>
+          </a:p>
+          <a:p>
+            <a:r>
+              <a:rPr lang="en-GB" dirty="0"/>
+              <a:t>Ski Lifts             		17.0</a:t>
+            </a:r>
+          </a:p>
+          <a:p>
+            <a:r>
+              <a:rPr lang="en-GB" dirty="0"/>
+              <a:t>Ski Pass Cost         		42.0</a:t>
+            </a:r>
+          </a:p>
+          <a:p>
+            <a:r>
+              <a:rPr lang="en-GB" dirty="0"/>
+              <a:t>Photo URL              		0.0</a:t>
+            </a:r>
           </a:p>
         </p:txBody>
       </p:sp>

</xml_diff>